<commit_message>
Added notes to benchmarking slide
</commit_message>
<xml_diff>
--- a/docs/presentation.pptx
+++ b/docs/presentation.pptx
@@ -202,7 +202,8 @@
           <a:p>
             <a:fld id="{D47E9658-922E-1446-8D67-07A05034B11D}" type="datetimeFigureOut">
               <a:rPr lang="de-DE" smtClean="0"/>
-              <a:t>24.01.14</a:t>
+              <a:pPr/>
+              <a:t>26.01.2014</a:t>
             </a:fld>
             <a:endParaRPr lang="de-DE"/>
           </a:p>
@@ -268,6 +269,7 @@
           <a:p>
             <a:fld id="{80D22A0A-573A-9049-99D6-16F5B60CB328}" type="slidenum">
               <a:rPr lang="de-DE" smtClean="0"/>
+              <a:pPr/>
               <a:t>‹Nr.›</a:t>
             </a:fld>
             <a:endParaRPr lang="de-DE"/>
@@ -277,7 +279,7 @@
     </p:spTree>
     <p:extLst>
       <p:ext uri="{BB962C8B-B14F-4D97-AF65-F5344CB8AC3E}">
-        <p14:creationId xmlns:p14="http://schemas.microsoft.com/office/powerpoint/2010/main" val="3990211256"/>
+        <p14:creationId xmlns:p14="http://schemas.microsoft.com/office/powerpoint/2010/main" xmlns="" val="3990211256"/>
       </p:ext>
     </p:extLst>
   </p:cSld>
@@ -368,7 +370,8 @@
           <a:p>
             <a:fld id="{35D45E2C-55D3-9F48-AC81-1DE0B06D30F4}" type="datetimeFigureOut">
               <a:rPr lang="de-DE" smtClean="0"/>
-              <a:t>24.01.14</a:t>
+              <a:pPr/>
+              <a:t>26.01.2014</a:t>
             </a:fld>
             <a:endParaRPr lang="de-DE"/>
           </a:p>
@@ -527,6 +530,7 @@
           <a:p>
             <a:fld id="{AE5E8D2D-D2F5-9642-A0D7-19654D6CF236}" type="slidenum">
               <a:rPr lang="de-DE" smtClean="0"/>
+              <a:pPr/>
               <a:t>‹Nr.›</a:t>
             </a:fld>
             <a:endParaRPr lang="de-DE"/>
@@ -536,7 +540,7 @@
     </p:spTree>
     <p:extLst>
       <p:ext uri="{BB962C8B-B14F-4D97-AF65-F5344CB8AC3E}">
-        <p14:creationId xmlns:p14="http://schemas.microsoft.com/office/powerpoint/2010/main" val="94524540"/>
+        <p14:creationId xmlns:p14="http://schemas.microsoft.com/office/powerpoint/2010/main" xmlns="" val="94524540"/>
       </p:ext>
     </p:extLst>
   </p:cSld>
@@ -702,6 +706,7 @@
           <a:p>
             <a:fld id="{AE5E8D2D-D2F5-9642-A0D7-19654D6CF236}" type="slidenum">
               <a:rPr lang="de-DE" smtClean="0"/>
+              <a:pPr/>
               <a:t>4</a:t>
             </a:fld>
             <a:endParaRPr lang="de-DE"/>
@@ -711,7 +716,7 @@
     </p:spTree>
     <p:extLst>
       <p:ext uri="{BB962C8B-B14F-4D97-AF65-F5344CB8AC3E}">
-        <p14:creationId xmlns:p14="http://schemas.microsoft.com/office/powerpoint/2010/main" val="2969178958"/>
+        <p14:creationId xmlns:p14="http://schemas.microsoft.com/office/powerpoint/2010/main" xmlns="" val="2969178958"/>
       </p:ext>
     </p:extLst>
   </p:cSld>
@@ -812,6 +817,7 @@
           <a:p>
             <a:fld id="{AE5E8D2D-D2F5-9642-A0D7-19654D6CF236}" type="slidenum">
               <a:rPr lang="de-DE" smtClean="0"/>
+              <a:pPr/>
               <a:t>5</a:t>
             </a:fld>
             <a:endParaRPr lang="de-DE"/>
@@ -821,9 +827,181 @@
     </p:spTree>
     <p:extLst>
       <p:ext uri="{BB962C8B-B14F-4D97-AF65-F5344CB8AC3E}">
-        <p14:creationId xmlns:p14="http://schemas.microsoft.com/office/powerpoint/2010/main" val="4131177804"/>
+        <p14:creationId xmlns:p14="http://schemas.microsoft.com/office/powerpoint/2010/main" xmlns="" val="4131177804"/>
       </p:ext>
     </p:extLst>
+  </p:cSld>
+  <p:clrMapOvr>
+    <a:masterClrMapping/>
+  </p:clrMapOvr>
+</p:notes>
+</file>
+
+<file path=ppt/notesSlides/notesSlide3.xml><?xml version="1.0" encoding="utf-8"?>
+<p:notes xmlns:a="http://schemas.openxmlformats.org/drawingml/2006/main" xmlns:r="http://schemas.openxmlformats.org/officeDocument/2006/relationships" xmlns:p="http://schemas.openxmlformats.org/presentationml/2006/main">
+  <p:cSld>
+    <p:spTree>
+      <p:nvGrpSpPr>
+        <p:cNvPr id="1" name=""/>
+        <p:cNvGrpSpPr/>
+        <p:nvPr/>
+      </p:nvGrpSpPr>
+      <p:grpSpPr>
+        <a:xfrm>
+          <a:off x="0" y="0"/>
+          <a:ext cx="0" cy="0"/>
+          <a:chOff x="0" y="0"/>
+          <a:chExt cx="0" cy="0"/>
+        </a:xfrm>
+      </p:grpSpPr>
+      <p:sp>
+        <p:nvSpPr>
+          <p:cNvPr id="2" name="Folienbildplatzhalter 1"/>
+          <p:cNvSpPr>
+            <a:spLocks noGrp="1" noRot="1" noChangeAspect="1"/>
+          </p:cNvSpPr>
+          <p:nvPr>
+            <p:ph type="sldImg"/>
+          </p:nvPr>
+        </p:nvSpPr>
+        <p:spPr/>
+      </p:sp>
+      <p:sp>
+        <p:nvSpPr>
+          <p:cNvPr id="3" name="Notizenplatzhalter 2"/>
+          <p:cNvSpPr>
+            <a:spLocks noGrp="1"/>
+          </p:cNvSpPr>
+          <p:nvPr>
+            <p:ph type="body" idx="1"/>
+          </p:nvPr>
+        </p:nvSpPr>
+        <p:spPr/>
+        <p:txBody>
+          <a:bodyPr>
+            <a:normAutofit/>
+          </a:bodyPr>
+          <a:lstStyle/>
+          <a:p>
+            <a:pPr>
+              <a:buFontTx/>
+              <a:buChar char="-"/>
+            </a:pPr>
+            <a:r>
+              <a:rPr lang="de-DE" dirty="0" err="1" smtClean="0"/>
+              <a:t>Benchmarking</a:t>
+            </a:r>
+            <a:r>
+              <a:rPr lang="de-DE" dirty="0" smtClean="0"/>
+              <a:t> Client: C#-CLI</a:t>
+            </a:r>
+          </a:p>
+          <a:p>
+            <a:pPr lvl="1">
+              <a:buFontTx/>
+              <a:buChar char="-"/>
+            </a:pPr>
+            <a:r>
+              <a:rPr lang="de-DE" dirty="0" smtClean="0"/>
+              <a:t> Parameter: 1) URLs</a:t>
+            </a:r>
+          </a:p>
+          <a:p>
+            <a:pPr lvl="1">
+              <a:buFontTx/>
+              <a:buNone/>
+            </a:pPr>
+            <a:r>
+              <a:rPr lang="de-DE" dirty="0" smtClean="0"/>
+              <a:t>		2)</a:t>
+            </a:r>
+            <a:r>
+              <a:rPr lang="de-DE" baseline="0" dirty="0" smtClean="0"/>
+              <a:t> Aufrufhäufigkeit (1:1 wie auf Übungsblatt)</a:t>
+            </a:r>
+          </a:p>
+          <a:p>
+            <a:pPr lvl="1">
+              <a:buFontTx/>
+              <a:buNone/>
+            </a:pPr>
+            <a:r>
+              <a:rPr lang="de-DE" baseline="0" dirty="0" smtClean="0"/>
+              <a:t>		3) Anzahl Terminals</a:t>
+            </a:r>
+          </a:p>
+          <a:p>
+            <a:pPr lvl="1">
+              <a:buFontTx/>
+              <a:buNone/>
+            </a:pPr>
+            <a:r>
+              <a:rPr lang="de-DE" baseline="0" dirty="0" smtClean="0"/>
+              <a:t>		4) Zeit zwischen </a:t>
+            </a:r>
+            <a:r>
+              <a:rPr lang="de-DE" baseline="0" dirty="0" err="1" smtClean="0"/>
+              <a:t>Calls</a:t>
+            </a:r>
+            <a:endParaRPr lang="de-DE" baseline="0" dirty="0" smtClean="0"/>
+          </a:p>
+          <a:p>
+            <a:pPr lvl="1">
+              <a:buFontTx/>
+              <a:buNone/>
+            </a:pPr>
+            <a:r>
+              <a:rPr lang="de-DE" baseline="0" dirty="0" smtClean="0"/>
+              <a:t>		5) Switch, der Ergebnisse direkt in CSV File </a:t>
+            </a:r>
+            <a:r>
+              <a:rPr lang="de-DE" baseline="0" dirty="0" err="1" smtClean="0"/>
+              <a:t>piped</a:t>
+            </a:r>
+            <a:r>
+              <a:rPr lang="de-DE" baseline="0" dirty="0" smtClean="0"/>
+              <a:t> (Aggregiert total + Aggregiert </a:t>
+            </a:r>
+            <a:r>
+              <a:rPr lang="de-DE" baseline="0" smtClean="0"/>
+              <a:t>pro Ziel-URL)</a:t>
+            </a:r>
+            <a:endParaRPr lang="en-GB" baseline="0" smtClean="0"/>
+          </a:p>
+          <a:p>
+            <a:pPr lvl="1">
+              <a:buFontTx/>
+              <a:buNone/>
+            </a:pPr>
+            <a:endParaRPr lang="de-DE" baseline="0" dirty="0" smtClean="0"/>
+          </a:p>
+        </p:txBody>
+      </p:sp>
+      <p:sp>
+        <p:nvSpPr>
+          <p:cNvPr id="4" name="Foliennummernplatzhalter 3"/>
+          <p:cNvSpPr>
+            <a:spLocks noGrp="1"/>
+          </p:cNvSpPr>
+          <p:nvPr>
+            <p:ph type="sldNum" sz="quarter" idx="10"/>
+          </p:nvPr>
+        </p:nvSpPr>
+        <p:spPr/>
+        <p:txBody>
+          <a:bodyPr/>
+          <a:lstStyle/>
+          <a:p>
+            <a:fld id="{AE5E8D2D-D2F5-9642-A0D7-19654D6CF236}" type="slidenum">
+              <a:rPr lang="de-DE" smtClean="0"/>
+              <a:pPr/>
+              <a:t>6</a:t>
+            </a:fld>
+            <a:endParaRPr lang="de-DE"/>
+          </a:p>
+        </p:txBody>
+      </p:sp>
+    </p:spTree>
   </p:cSld>
   <p:clrMapOvr>
     <a:masterClrMapping/>
@@ -857,7 +1035,7 @@
           <p:nvPr userDrawn="1"/>
         </p:nvPicPr>
         <p:blipFill>
-          <a:blip r:embed="rId2"/>
+          <a:blip r:embed="rId2" cstate="print"/>
           <a:stretch>
             <a:fillRect/>
           </a:stretch>
@@ -1045,7 +1223,8 @@
           <a:p>
             <a:fld id="{9ABBB6ED-5864-CF4C-817A-3FB709F5DE13}" type="datetime1">
               <a:rPr lang="en-US" smtClean="0"/>
-              <a:t>24.01.14</a:t>
+              <a:pPr/>
+              <a:t>1/26/2014</a:t>
             </a:fld>
             <a:endParaRPr lang="en-US"/>
           </a:p>
@@ -1126,7 +1305,7 @@
           <p:nvPr userDrawn="1"/>
         </p:nvPicPr>
         <p:blipFill>
-          <a:blip r:embed="rId3"/>
+          <a:blip r:embed="rId3" cstate="print"/>
           <a:stretch>
             <a:fillRect/>
           </a:stretch>
@@ -1385,7 +1564,8 @@
           <a:p>
             <a:fld id="{220AE175-C0F4-5C4C-A8FA-0DADCA4A648C}" type="datetime1">
               <a:rPr lang="en-US" smtClean="0"/>
-              <a:t>24.01.14</a:t>
+              <a:pPr/>
+              <a:t>1/26/2014</a:t>
             </a:fld>
             <a:endParaRPr lang="en-US"/>
           </a:p>
@@ -1610,7 +1790,8 @@
           <a:p>
             <a:fld id="{44816CBC-07CA-3049-932D-0F621D5882D7}" type="datetime1">
               <a:rPr lang="en-US" smtClean="0"/>
-              <a:t>24.01.14</a:t>
+              <a:pPr/>
+              <a:t>1/26/2014</a:t>
             </a:fld>
             <a:endParaRPr lang="en-US"/>
           </a:p>
@@ -1835,7 +2016,8 @@
           <a:p>
             <a:fld id="{AD11CFC6-54E5-9F4E-9F23-771F7EDEC23A}" type="datetime1">
               <a:rPr lang="en-US" smtClean="0"/>
-              <a:t>24.01.14</a:t>
+              <a:pPr/>
+              <a:t>1/26/2014</a:t>
             </a:fld>
             <a:endParaRPr lang="en-US"/>
           </a:p>
@@ -2172,7 +2354,8 @@
           <a:p>
             <a:fld id="{E384C15D-B26D-4C40-A898-C196925B36C5}" type="datetime1">
               <a:rPr lang="en-US" smtClean="0"/>
-              <a:t>24.01.14</a:t>
+              <a:pPr/>
+              <a:t>1/26/2014</a:t>
             </a:fld>
             <a:endParaRPr lang="en-US"/>
           </a:p>
@@ -2511,7 +2694,8 @@
           <a:p>
             <a:fld id="{38993681-2691-1244-81A5-5DEFA9A55968}" type="datetime1">
               <a:rPr lang="en-US" smtClean="0"/>
-              <a:t>24.01.14</a:t>
+              <a:pPr/>
+              <a:t>1/26/2014</a:t>
             </a:fld>
             <a:endParaRPr lang="en-US"/>
           </a:p>
@@ -2991,7 +3175,8 @@
           <a:p>
             <a:fld id="{B052336D-603C-6840-8941-D14C5EB42324}" type="datetime1">
               <a:rPr lang="en-US" smtClean="0"/>
-              <a:t>24.01.14</a:t>
+              <a:pPr/>
+              <a:t>1/26/2014</a:t>
             </a:fld>
             <a:endParaRPr lang="en-US"/>
           </a:p>
@@ -3219,7 +3404,8 @@
           <a:p>
             <a:fld id="{1ACCCE5A-A646-154F-8C8B-9ECE221FFE2B}" type="datetime1">
               <a:rPr lang="en-US" smtClean="0"/>
-              <a:t>24.01.14</a:t>
+              <a:pPr/>
+              <a:t>1/26/2014</a:t>
             </a:fld>
             <a:endParaRPr lang="en-US"/>
           </a:p>
@@ -3356,7 +3542,8 @@
           <a:p>
             <a:fld id="{A35F542B-B047-F84E-8D15-AB6D723FED92}" type="datetime1">
               <a:rPr lang="en-US" smtClean="0"/>
-              <a:t>24.01.14</a:t>
+              <a:pPr/>
+              <a:t>1/26/2014</a:t>
             </a:fld>
             <a:endParaRPr lang="en-US"/>
           </a:p>
@@ -3686,7 +3873,8 @@
           <a:p>
             <a:fld id="{969196BD-92B3-834F-812E-A58AC89CD135}" type="datetime1">
               <a:rPr lang="en-US" smtClean="0"/>
-              <a:t>24.01.14</a:t>
+              <a:pPr/>
+              <a:t>1/26/2014</a:t>
             </a:fld>
             <a:endParaRPr lang="en-US"/>
           </a:p>
@@ -4035,7 +4223,8 @@
           <a:p>
             <a:fld id="{460FC2CE-A0FC-7141-AF65-36DF018D98EE}" type="datetime1">
               <a:rPr lang="en-US" smtClean="0"/>
-              <a:t>24.01.14</a:t>
+              <a:pPr/>
+              <a:t>1/26/2014</a:t>
             </a:fld>
             <a:endParaRPr lang="en-US"/>
           </a:p>
@@ -4262,7 +4451,8 @@
           <a:p>
             <a:fld id="{300EB746-111B-514A-BDA9-2D694A62EC1B}" type="datetime1">
               <a:rPr lang="en-US" smtClean="0"/>
-              <a:t>24.01.14</a:t>
+              <a:pPr/>
+              <a:t>1/26/2014</a:t>
             </a:fld>
             <a:endParaRPr lang="en-US"/>
           </a:p>
@@ -4452,7 +4642,7 @@
           <p:nvPr userDrawn="1"/>
         </p:nvPicPr>
         <p:blipFill>
-          <a:blip r:embed="rId13"/>
+          <a:blip r:embed="rId13" cstate="print"/>
           <a:stretch>
             <a:fillRect/>
           </a:stretch>
@@ -4476,7 +4666,7 @@
           <p:nvPr userDrawn="1"/>
         </p:nvPicPr>
         <p:blipFill>
-          <a:blip r:embed="rId14"/>
+          <a:blip r:embed="rId14" cstate="print"/>
           <a:stretch>
             <a:fillRect/>
           </a:stretch>
@@ -5072,7 +5262,7 @@
     </p:spTree>
     <p:extLst>
       <p:ext uri="{BB962C8B-B14F-4D97-AF65-F5344CB8AC3E}">
-        <p14:creationId xmlns:p14="http://schemas.microsoft.com/office/powerpoint/2010/main" val="2161457405"/>
+        <p14:creationId xmlns:p14="http://schemas.microsoft.com/office/powerpoint/2010/main" xmlns="" val="2161457405"/>
       </p:ext>
     </p:extLst>
   </p:cSld>
@@ -5082,7 +5272,7 @@
   <p:timing>
     <p:tnLst>
       <p:par>
-        <p:cTn xmlns:p14="http://schemas.microsoft.com/office/powerpoint/2010/main" id="1" dur="indefinite" restart="never" nodeType="tmRoot"/>
+        <p:cTn id="1" dur="indefinite" restart="never" nodeType="tmRoot"/>
       </p:par>
     </p:tnLst>
   </p:timing>
@@ -5128,11 +5318,7 @@
           <a:p>
             <a:r>
               <a:rPr lang="de-DE" sz="4400" dirty="0" smtClean="0"/>
-              <a:t>Projekt, </a:t>
-            </a:r>
-            <a:r>
-              <a:rPr lang="de-DE" sz="4400" dirty="0" smtClean="0"/>
-              <a:t>Datenbanksysteme</a:t>
+              <a:t>Projekt, Datenbanksysteme</a:t>
             </a:r>
             <a:endParaRPr lang="de-DE" sz="7200" dirty="0"/>
           </a:p>
@@ -5190,11 +5376,7 @@
           <a:p>
             <a:r>
               <a:rPr lang="de-DE" dirty="0" smtClean="0"/>
-              <a:t>Jan Michael </a:t>
-            </a:r>
-            <a:r>
-              <a:rPr lang="de-DE" dirty="0" smtClean="0"/>
-              <a:t>Auer, Manuel </a:t>
+              <a:t>Jan Michael Auer, Manuel </a:t>
             </a:r>
             <a:r>
               <a:rPr lang="de-DE" dirty="0" err="1" smtClean="0"/>
@@ -5211,7 +5393,7 @@
     </p:spTree>
     <p:extLst>
       <p:ext uri="{BB962C8B-B14F-4D97-AF65-F5344CB8AC3E}">
-        <p14:creationId xmlns:p14="http://schemas.microsoft.com/office/powerpoint/2010/main" val="674316842"/>
+        <p14:creationId xmlns:p14="http://schemas.microsoft.com/office/powerpoint/2010/main" xmlns="" val="674316842"/>
       </p:ext>
     </p:extLst>
   </p:cSld>
@@ -5219,13 +5401,13 @@
     <a:masterClrMapping/>
   </p:clrMapOvr>
   <mc:AlternateContent xmlns:mc="http://schemas.openxmlformats.org/markup-compatibility/2006">
-    <mc:Choice xmlns:p14="http://schemas.microsoft.com/office/powerpoint/2010/main" Requires="p14">
+    <mc:Choice xmlns:p14="http://schemas.microsoft.com/office/powerpoint/2010/main" xmlns="" Requires="p14">
       <p:transition spd="med" p14:dur="700">
         <p:fade/>
       </p:transition>
     </mc:Choice>
     <mc:Fallback>
-      <p:transition xmlns:p14="http://schemas.microsoft.com/office/powerpoint/2010/main" spd="med">
+      <p:transition spd="med">
         <p:fade/>
       </p:transition>
     </mc:Fallback>
@@ -5233,7 +5415,7 @@
   <p:timing>
     <p:tnLst>
       <p:par>
-        <p:cTn xmlns:p14="http://schemas.microsoft.com/office/powerpoint/2010/main" id="1" dur="indefinite" restart="never" nodeType="tmRoot"/>
+        <p:cTn id="1" dur="indefinite" restart="never" nodeType="tmRoot"/>
       </p:par>
     </p:tnLst>
   </p:timing>
@@ -5427,7 +5609,7 @@
     </p:spTree>
     <p:extLst>
       <p:ext uri="{BB962C8B-B14F-4D97-AF65-F5344CB8AC3E}">
-        <p14:creationId xmlns:p14="http://schemas.microsoft.com/office/powerpoint/2010/main" val="2431912478"/>
+        <p14:creationId xmlns:p14="http://schemas.microsoft.com/office/powerpoint/2010/main" xmlns="" val="2431912478"/>
       </p:ext>
     </p:extLst>
   </p:cSld>
@@ -5435,13 +5617,13 @@
     <a:masterClrMapping/>
   </p:clrMapOvr>
   <mc:AlternateContent xmlns:mc="http://schemas.openxmlformats.org/markup-compatibility/2006">
-    <mc:Choice xmlns:p14="http://schemas.microsoft.com/office/powerpoint/2010/main" Requires="p14">
+    <mc:Choice xmlns:p14="http://schemas.microsoft.com/office/powerpoint/2010/main" xmlns="" Requires="p14">
       <p:transition spd="med" p14:dur="700">
         <p:fade/>
       </p:transition>
     </mc:Choice>
     <mc:Fallback>
-      <p:transition xmlns:p14="http://schemas.microsoft.com/office/powerpoint/2010/main" spd="med">
+      <p:transition spd="med">
         <p:fade/>
       </p:transition>
     </mc:Fallback>
@@ -5449,7 +5631,7 @@
   <p:timing>
     <p:tnLst>
       <p:par>
-        <p:cTn xmlns:p14="http://schemas.microsoft.com/office/powerpoint/2010/main" id="1" dur="indefinite" restart="never" nodeType="tmRoot"/>
+        <p:cTn id="1" dur="indefinite" restart="never" nodeType="tmRoot"/>
       </p:par>
     </p:tnLst>
   </p:timing>
@@ -5485,7 +5667,7 @@
           <a:blip r:embed="rId3" cstate="print">
             <a:extLst>
               <a:ext uri="{28A0092B-C50C-407E-A947-70E740481C1C}">
-                <a14:useLocalDpi xmlns:a14="http://schemas.microsoft.com/office/drawing/2010/main" val="0"/>
+                <a14:useLocalDpi xmlns:a14="http://schemas.microsoft.com/office/drawing/2010/main" xmlns="" val="0"/>
               </a:ext>
             </a:extLst>
           </a:blip>
@@ -5725,20 +5907,20 @@
     </p:spTree>
     <p:extLst>
       <p:ext uri="{BB962C8B-B14F-4D97-AF65-F5344CB8AC3E}">
-        <p14:creationId xmlns:p14="http://schemas.microsoft.com/office/powerpoint/2010/main" val="811630741"/>
+        <p14:creationId xmlns:p14="http://schemas.microsoft.com/office/powerpoint/2010/main" xmlns="" val="811630741"/>
       </p:ext>
     </p:extLst>
   </p:cSld>
   <p:clrMapOvr>
     <a:masterClrMapping/>
   </p:clrMapOvr>
-  <p:transition xmlns:p14="http://schemas.microsoft.com/office/powerpoint/2010/main" spd="slow">
+  <p:transition spd="slow">
     <p:fade thruBlk="1"/>
   </p:transition>
   <p:timing>
     <p:tnLst>
       <p:par>
-        <p:cTn xmlns:p14="http://schemas.microsoft.com/office/powerpoint/2010/main" id="1" dur="indefinite" restart="never" nodeType="tmRoot"/>
+        <p:cTn id="1" dur="indefinite" restart="never" nodeType="tmRoot"/>
       </p:par>
     </p:tnLst>
   </p:timing>
@@ -5911,7 +6093,6 @@
               <a:rPr lang="de-DE" dirty="0" smtClean="0"/>
               <a:t>?</a:t>
             </a:r>
-            <a:endParaRPr lang="de-DE" dirty="0" smtClean="0"/>
           </a:p>
         </p:txBody>
       </p:sp>
@@ -6127,14 +6308,7 @@
                 <a:latin typeface="Menlo Regular"/>
                 <a:cs typeface="Menlo Regular"/>
               </a:rPr>
-              <a:t> </a:t>
-            </a:r>
-            <a:r>
-              <a:rPr lang="de-DE" sz="1900" dirty="0">
-                <a:latin typeface="Menlo Regular"/>
-                <a:cs typeface="Menlo Regular"/>
-              </a:rPr>
-              <a:t> </a:t>
+              <a:t>  </a:t>
             </a:r>
             <a:r>
               <a:rPr lang="de-DE" sz="1900" b="1" dirty="0" smtClean="0">
@@ -6696,7 +6870,7 @@
     </p:spTree>
     <p:extLst>
       <p:ext uri="{BB962C8B-B14F-4D97-AF65-F5344CB8AC3E}">
-        <p14:creationId xmlns:p14="http://schemas.microsoft.com/office/powerpoint/2010/main" val="269492421"/>
+        <p14:creationId xmlns:p14="http://schemas.microsoft.com/office/powerpoint/2010/main" xmlns="" val="269492421"/>
       </p:ext>
     </p:extLst>
   </p:cSld>
@@ -6704,13 +6878,13 @@
     <a:masterClrMapping/>
   </p:clrMapOvr>
   <mc:AlternateContent xmlns:mc="http://schemas.openxmlformats.org/markup-compatibility/2006">
-    <mc:Choice xmlns:p14="http://schemas.microsoft.com/office/powerpoint/2010/main" Requires="p14">
+    <mc:Choice xmlns:p14="http://schemas.microsoft.com/office/powerpoint/2010/main" xmlns="" Requires="p14">
       <p:transition spd="med" p14:dur="700">
         <p:fade/>
       </p:transition>
     </mc:Choice>
     <mc:Fallback>
-      <p:transition xmlns:p14="http://schemas.microsoft.com/office/powerpoint/2010/main" spd="med">
+      <p:transition spd="med">
         <p:fade/>
       </p:transition>
     </mc:Fallback>
@@ -6718,7 +6892,7 @@
   <p:timing>
     <p:tnLst>
       <p:par>
-        <p:cTn xmlns:p14="http://schemas.microsoft.com/office/powerpoint/2010/main" id="1" dur="indefinite" restart="never" nodeType="tmRoot">
+        <p:cTn id="1" dur="indefinite" restart="never" nodeType="tmRoot">
           <p:childTnLst>
             <p:seq concurrent="1" nextAc="seek">
               <p:cTn id="2" dur="indefinite" nodeType="mainSeq">
@@ -6831,7 +7005,7 @@
             <p:ph idx="1"/>
             <p:extLst>
               <p:ext uri="{D42A27DB-BD31-4B8C-83A1-F6EECF244321}">
-                <p14:modId xmlns:p14="http://schemas.microsoft.com/office/powerpoint/2010/main" val="1955450083"/>
+                <p14:modId xmlns:p14="http://schemas.microsoft.com/office/powerpoint/2010/main" xmlns="" val="1955450083"/>
               </p:ext>
             </p:extLst>
           </p:nvPr>
@@ -7444,7 +7618,7 @@
     </p:spTree>
     <p:extLst>
       <p:ext uri="{BB962C8B-B14F-4D97-AF65-F5344CB8AC3E}">
-        <p14:creationId xmlns:p14="http://schemas.microsoft.com/office/powerpoint/2010/main" val="299923811"/>
+        <p14:creationId xmlns:p14="http://schemas.microsoft.com/office/powerpoint/2010/main" xmlns="" val="299923811"/>
       </p:ext>
     </p:extLst>
   </p:cSld>
@@ -7452,13 +7626,13 @@
     <a:masterClrMapping/>
   </p:clrMapOvr>
   <mc:AlternateContent xmlns:mc="http://schemas.openxmlformats.org/markup-compatibility/2006">
-    <mc:Choice xmlns:p14="http://schemas.microsoft.com/office/powerpoint/2010/main" Requires="p14">
+    <mc:Choice xmlns:p14="http://schemas.microsoft.com/office/powerpoint/2010/main" xmlns="" Requires="p14">
       <p:transition spd="med" p14:dur="700">
         <p:fade/>
       </p:transition>
     </mc:Choice>
     <mc:Fallback>
-      <p:transition xmlns:p14="http://schemas.microsoft.com/office/powerpoint/2010/main" spd="med">
+      <p:transition spd="med">
         <p:fade/>
       </p:transition>
     </mc:Fallback>
@@ -7466,7 +7640,7 @@
   <p:timing>
     <p:tnLst>
       <p:par>
-        <p:cTn xmlns:p14="http://schemas.microsoft.com/office/powerpoint/2010/main" id="1" dur="indefinite" restart="never" nodeType="tmRoot">
+        <p:cTn id="1" dur="indefinite" restart="never" nodeType="tmRoot">
           <p:childTnLst>
             <p:seq concurrent="1" nextAc="seek">
               <p:cTn id="2" dur="indefinite" nodeType="mainSeq">
@@ -7766,7 +7940,7 @@
     </p:spTree>
     <p:extLst>
       <p:ext uri="{BB962C8B-B14F-4D97-AF65-F5344CB8AC3E}">
-        <p14:creationId xmlns:p14="http://schemas.microsoft.com/office/powerpoint/2010/main" val="1624581442"/>
+        <p14:creationId xmlns:p14="http://schemas.microsoft.com/office/powerpoint/2010/main" xmlns="" val="1624581442"/>
       </p:ext>
     </p:extLst>
   </p:cSld>
@@ -7774,13 +7948,13 @@
     <a:masterClrMapping/>
   </p:clrMapOvr>
   <mc:AlternateContent xmlns:mc="http://schemas.openxmlformats.org/markup-compatibility/2006">
-    <mc:Choice xmlns:p14="http://schemas.microsoft.com/office/powerpoint/2010/main" Requires="p14">
+    <mc:Choice xmlns:p14="http://schemas.microsoft.com/office/powerpoint/2010/main" xmlns="" Requires="p14">
       <p:transition spd="slow" p14:dur="1400">
         <p14:ripple/>
       </p:transition>
     </mc:Choice>
     <mc:Fallback>
-      <p:transition xmlns:p14="http://schemas.microsoft.com/office/powerpoint/2010/main" spd="slow">
+      <p:transition spd="slow">
         <p:fade/>
       </p:transition>
     </mc:Fallback>
@@ -7788,7 +7962,7 @@
   <p:timing>
     <p:tnLst>
       <p:par>
-        <p:cTn xmlns:p14="http://schemas.microsoft.com/office/powerpoint/2010/main" id="1" dur="indefinite" restart="never" nodeType="tmRoot"/>
+        <p:cTn id="1" dur="indefinite" restart="never" nodeType="tmRoot"/>
       </p:par>
     </p:tnLst>
   </p:timing>
@@ -7896,7 +8070,7 @@
           <p:nvPr/>
         </p:nvPicPr>
         <p:blipFill>
-          <a:blip r:embed="rId2">
+          <a:blip r:embed="rId2" cstate="print">
             <a:clrChange>
               <a:clrFrom>
                 <a:srgbClr val="FFFFFF"/>
@@ -7910,7 +8084,7 @@
             <a:alphaModFix/>
             <a:extLst>
               <a:ext uri="{28A0092B-C50C-407E-A947-70E740481C1C}">
-                <a14:useLocalDpi xmlns:a14="http://schemas.microsoft.com/office/drawing/2010/main" val="0"/>
+                <a14:useLocalDpi xmlns:a14="http://schemas.microsoft.com/office/drawing/2010/main" xmlns="" val="0"/>
               </a:ext>
             </a:extLst>
           </a:blip>
@@ -7970,20 +8144,20 @@
     </p:spTree>
     <p:extLst>
       <p:ext uri="{BB962C8B-B14F-4D97-AF65-F5344CB8AC3E}">
-        <p14:creationId xmlns:p14="http://schemas.microsoft.com/office/powerpoint/2010/main" val="3005027331"/>
+        <p14:creationId xmlns:p14="http://schemas.microsoft.com/office/powerpoint/2010/main" xmlns="" val="3005027331"/>
       </p:ext>
     </p:extLst>
   </p:cSld>
   <p:clrMapOvr>
     <a:masterClrMapping/>
   </p:clrMapOvr>
-  <p:transition xmlns:p14="http://schemas.microsoft.com/office/powerpoint/2010/main" spd="slow">
+  <p:transition spd="slow">
     <p:fade thruBlk="1"/>
   </p:transition>
   <p:timing>
     <p:tnLst>
       <p:par>
-        <p:cTn xmlns:p14="http://schemas.microsoft.com/office/powerpoint/2010/main" id="1" dur="indefinite" restart="never" nodeType="tmRoot"/>
+        <p:cTn id="1" dur="indefinite" restart="never" nodeType="tmRoot"/>
       </p:par>
     </p:tnLst>
   </p:timing>

</xml_diff>